<commit_message>
Finished chapter 4 and 5, inclusive first corrections/read-through.
</commit_message>
<xml_diff>
--- a/Figures/ParSynthesising.pptx
+++ b/Figures/ParSynthesising.pptx
@@ -288,7 +288,7 @@
           <a:p>
             <a:fld id="{47B9A199-D001-9B4E-B758-14EC809AFE55}" type="datetimeFigureOut">
               <a:rPr lang="da-DK" smtClean="0"/>
-              <a:t>10/08/14</a:t>
+              <a:t>16/08/14</a:t>
             </a:fld>
             <a:endParaRPr lang="en-GB"/>
           </a:p>
@@ -458,7 +458,7 @@
           <a:p>
             <a:fld id="{47B9A199-D001-9B4E-B758-14EC809AFE55}" type="datetimeFigureOut">
               <a:rPr lang="da-DK" smtClean="0"/>
-              <a:t>10/08/14</a:t>
+              <a:t>16/08/14</a:t>
             </a:fld>
             <a:endParaRPr lang="en-GB"/>
           </a:p>
@@ -638,7 +638,7 @@
           <a:p>
             <a:fld id="{47B9A199-D001-9B4E-B758-14EC809AFE55}" type="datetimeFigureOut">
               <a:rPr lang="da-DK" smtClean="0"/>
-              <a:t>10/08/14</a:t>
+              <a:t>16/08/14</a:t>
             </a:fld>
             <a:endParaRPr lang="en-GB"/>
           </a:p>
@@ -808,7 +808,7 @@
           <a:p>
             <a:fld id="{47B9A199-D001-9B4E-B758-14EC809AFE55}" type="datetimeFigureOut">
               <a:rPr lang="da-DK" smtClean="0"/>
-              <a:t>10/08/14</a:t>
+              <a:t>16/08/14</a:t>
             </a:fld>
             <a:endParaRPr lang="en-GB"/>
           </a:p>
@@ -1054,7 +1054,7 @@
           <a:p>
             <a:fld id="{47B9A199-D001-9B4E-B758-14EC809AFE55}" type="datetimeFigureOut">
               <a:rPr lang="da-DK" smtClean="0"/>
-              <a:t>10/08/14</a:t>
+              <a:t>16/08/14</a:t>
             </a:fld>
             <a:endParaRPr lang="en-GB"/>
           </a:p>
@@ -1342,7 +1342,7 @@
           <a:p>
             <a:fld id="{47B9A199-D001-9B4E-B758-14EC809AFE55}" type="datetimeFigureOut">
               <a:rPr lang="da-DK" smtClean="0"/>
-              <a:t>10/08/14</a:t>
+              <a:t>16/08/14</a:t>
             </a:fld>
             <a:endParaRPr lang="en-GB"/>
           </a:p>
@@ -1764,7 +1764,7 @@
           <a:p>
             <a:fld id="{47B9A199-D001-9B4E-B758-14EC809AFE55}" type="datetimeFigureOut">
               <a:rPr lang="da-DK" smtClean="0"/>
-              <a:t>10/08/14</a:t>
+              <a:t>16/08/14</a:t>
             </a:fld>
             <a:endParaRPr lang="en-GB"/>
           </a:p>
@@ -1882,7 +1882,7 @@
           <a:p>
             <a:fld id="{47B9A199-D001-9B4E-B758-14EC809AFE55}" type="datetimeFigureOut">
               <a:rPr lang="da-DK" smtClean="0"/>
-              <a:t>10/08/14</a:t>
+              <a:t>16/08/14</a:t>
             </a:fld>
             <a:endParaRPr lang="en-GB"/>
           </a:p>
@@ -1977,7 +1977,7 @@
           <a:p>
             <a:fld id="{47B9A199-D001-9B4E-B758-14EC809AFE55}" type="datetimeFigureOut">
               <a:rPr lang="da-DK" smtClean="0"/>
-              <a:t>10/08/14</a:t>
+              <a:t>16/08/14</a:t>
             </a:fld>
             <a:endParaRPr lang="en-GB"/>
           </a:p>
@@ -2254,7 +2254,7 @@
           <a:p>
             <a:fld id="{47B9A199-D001-9B4E-B758-14EC809AFE55}" type="datetimeFigureOut">
               <a:rPr lang="da-DK" smtClean="0"/>
-              <a:t>10/08/14</a:t>
+              <a:t>16/08/14</a:t>
             </a:fld>
             <a:endParaRPr lang="en-GB"/>
           </a:p>
@@ -2507,7 +2507,7 @@
           <a:p>
             <a:fld id="{47B9A199-D001-9B4E-B758-14EC809AFE55}" type="datetimeFigureOut">
               <a:rPr lang="da-DK" smtClean="0"/>
-              <a:t>10/08/14</a:t>
+              <a:t>16/08/14</a:t>
             </a:fld>
             <a:endParaRPr lang="en-GB"/>
           </a:p>
@@ -2720,7 +2720,7 @@
           <a:p>
             <a:fld id="{47B9A199-D001-9B4E-B758-14EC809AFE55}" type="datetimeFigureOut">
               <a:rPr lang="da-DK" smtClean="0"/>
-              <a:t>10/08/14</a:t>
+              <a:t>16/08/14</a:t>
             </a:fld>
             <a:endParaRPr lang="en-GB"/>
           </a:p>
@@ -3104,7 +3104,7 @@
         <p:spPr>
           <a:xfrm>
             <a:off x="627430" y="2538296"/>
-            <a:ext cx="8048546" cy="2308324"/>
+            <a:ext cx="8516570" cy="2308324"/>
           </a:xfrm>
           <a:prstGeom prst="rect">
             <a:avLst/>
@@ -3125,7 +3125,7 @@
                 <a:latin typeface="Lucida Console"/>
                 <a:cs typeface="Lucida Console"/>
               </a:rPr>
-              <a:t>Synthesise</a:t>
+              <a:t>SynthesisePar</a:t>
             </a:r>
             <a:r>
               <a:rPr lang="en-US" b="1" dirty="0" smtClean="0">
@@ -3155,10 +3155,232 @@
                 <a:latin typeface="Lucida Console"/>
                 <a:cs typeface="Lucida Console"/>
               </a:rPr>
-              <a:t>ParD</a:t>
-            </a:r>
-            <a:r>
-              <a:rPr lang="en-US" b="1" dirty="0" err="1" smtClean="0">
+              <a:t>ParDesc</a:t>
+            </a:r>
+            <a:r>
+              <a:rPr lang="en-US" b="1" dirty="0" smtClean="0">
+                <a:solidFill>
+                  <a:schemeClr val="accent2">
+                    <a:lumMod val="60000"/>
+                    <a:lumOff val="40000"/>
+                  </a:schemeClr>
+                </a:solidFill>
+                <a:latin typeface="Lucida Console"/>
+                <a:cs typeface="Lucida Console"/>
+              </a:rPr>
+              <a:t> </a:t>
+            </a:r>
+            <a:r>
+              <a:rPr lang="en-US" b="1" dirty="0" smtClean="0">
+                <a:latin typeface="Lucida Console"/>
+                <a:cs typeface="Lucida Console"/>
+              </a:rPr>
+              <a:t>-</a:t>
+            </a:r>
+            <a:r>
+              <a:rPr lang="en-US" b="1" dirty="0">
+                <a:latin typeface="Lucida Console"/>
+                <a:cs typeface="Lucida Console"/>
+              </a:rPr>
+              <a:t>&gt; </a:t>
+            </a:r>
+            <a:r>
+              <a:rPr lang="en-US" b="1" dirty="0" smtClean="0">
+                <a:latin typeface="Lucida Console"/>
+                <a:cs typeface="Lucida Console"/>
+              </a:rPr>
+              <a:t>(</a:t>
+            </a:r>
+            <a:r>
+              <a:rPr lang="en-US" b="1" dirty="0">
+                <a:solidFill>
+                  <a:srgbClr val="558ED5"/>
+                </a:solidFill>
+                <a:latin typeface="Lucida Console"/>
+                <a:cs typeface="Lucida Console"/>
+              </a:rPr>
+              <a:t>Type</a:t>
+            </a:r>
+            <a:r>
+              <a:rPr lang="en-US" b="1" dirty="0" smtClean="0">
+                <a:solidFill>
+                  <a:schemeClr val="accent2">
+                    <a:lumMod val="60000"/>
+                    <a:lumOff val="40000"/>
+                  </a:schemeClr>
+                </a:solidFill>
+                <a:latin typeface="Lucida Console"/>
+                <a:cs typeface="Lucida Console"/>
+              </a:rPr>
+              <a:t> </a:t>
+            </a:r>
+            <a:r>
+              <a:rPr lang="en-US" b="1" dirty="0" smtClean="0">
+                <a:latin typeface="Lucida Console"/>
+                <a:cs typeface="Lucida Console"/>
+              </a:rPr>
+              <a:t>-</a:t>
+            </a:r>
+            <a:r>
+              <a:rPr lang="en-US" b="1" dirty="0">
+                <a:latin typeface="Lucida Console"/>
+                <a:cs typeface="Lucida Console"/>
+              </a:rPr>
+              <a:t>&gt; </a:t>
+            </a:r>
+            <a:r>
+              <a:rPr lang="en-US" b="1" dirty="0">
+                <a:solidFill>
+                  <a:srgbClr val="558ED5"/>
+                </a:solidFill>
+                <a:latin typeface="Lucida Console"/>
+                <a:cs typeface="Lucida Console"/>
+              </a:rPr>
+              <a:t>Type</a:t>
+            </a:r>
+            <a:r>
+              <a:rPr lang="en-US" b="1" dirty="0">
+                <a:latin typeface="Lucida Console"/>
+                <a:cs typeface="Lucida Console"/>
+              </a:rPr>
+              <a:t>) -&gt; </a:t>
+            </a:r>
+            <a:r>
+              <a:rPr lang="en-US" b="1" dirty="0" smtClean="0">
+                <a:latin typeface="Lucida Console"/>
+                <a:cs typeface="Lucida Console"/>
+              </a:rPr>
+              <a:t>(</a:t>
+            </a:r>
+            <a:r>
+              <a:rPr lang="en-US" b="1" dirty="0">
+                <a:solidFill>
+                  <a:srgbClr val="558ED5"/>
+                </a:solidFill>
+                <a:latin typeface="Lucida Console"/>
+                <a:cs typeface="Lucida Console"/>
+              </a:rPr>
+              <a:t>Type</a:t>
+            </a:r>
+            <a:r>
+              <a:rPr lang="en-US" b="1" dirty="0" smtClean="0">
+                <a:solidFill>
+                  <a:srgbClr val="D99694"/>
+                </a:solidFill>
+                <a:latin typeface="Lucida Console"/>
+                <a:cs typeface="Lucida Console"/>
+              </a:rPr>
+              <a:t> </a:t>
+            </a:r>
+            <a:r>
+              <a:rPr lang="en-US" b="1" dirty="0" smtClean="0">
+                <a:latin typeface="Lucida Console"/>
+                <a:cs typeface="Lucida Console"/>
+              </a:rPr>
+              <a:t>-</a:t>
+            </a:r>
+            <a:r>
+              <a:rPr lang="en-US" b="1" dirty="0">
+                <a:latin typeface="Lucida Console"/>
+                <a:cs typeface="Lucida Console"/>
+              </a:rPr>
+              <a:t>&gt; </a:t>
+            </a:r>
+            <a:r>
+              <a:rPr lang="en-US" b="1" dirty="0">
+                <a:solidFill>
+                  <a:srgbClr val="558ED5"/>
+                </a:solidFill>
+                <a:latin typeface="Lucida Console"/>
+                <a:cs typeface="Lucida Console"/>
+              </a:rPr>
+              <a:t>Type</a:t>
+            </a:r>
+            <a:r>
+              <a:rPr lang="en-US" b="1" dirty="0">
+                <a:latin typeface="Lucida Console"/>
+                <a:cs typeface="Lucida Console"/>
+              </a:rPr>
+              <a:t>)</a:t>
+            </a:r>
+          </a:p>
+          <a:p>
+            <a:r>
+              <a:rPr lang="en-US" b="1" dirty="0" err="1">
+                <a:solidFill>
+                  <a:schemeClr val="accent2"/>
+                </a:solidFill>
+                <a:latin typeface="Lucida Console"/>
+                <a:cs typeface="Lucida Console"/>
+              </a:rPr>
+              <a:t>SynthesisePar</a:t>
+            </a:r>
+            <a:r>
+              <a:rPr lang="en-US" b="1" dirty="0">
+                <a:solidFill>
+                  <a:schemeClr val="accent2"/>
+                </a:solidFill>
+                <a:latin typeface="Lucida Console"/>
+                <a:cs typeface="Lucida Console"/>
+              </a:rPr>
+              <a:t> </a:t>
+            </a:r>
+            <a:r>
+              <a:rPr lang="en-US" b="1" dirty="0" smtClean="0">
+                <a:solidFill>
+                  <a:schemeClr val="accent3"/>
+                </a:solidFill>
+                <a:latin typeface="Lucida Console"/>
+                <a:cs typeface="Lucida Console"/>
+              </a:rPr>
+              <a:t>Ret</a:t>
+            </a:r>
+            <a:r>
+              <a:rPr lang="en-US" b="1" dirty="0" smtClean="0">
+                <a:latin typeface="Lucida Console"/>
+                <a:cs typeface="Lucida Console"/>
+              </a:rPr>
+              <a:t>       </a:t>
+            </a:r>
+            <a:r>
+              <a:rPr lang="en-US" b="1" dirty="0" smtClean="0">
+                <a:solidFill>
+                  <a:srgbClr val="D99694"/>
+                </a:solidFill>
+                <a:latin typeface="Lucida Console"/>
+                <a:cs typeface="Lucida Console"/>
+              </a:rPr>
+              <a:t>x </a:t>
+            </a:r>
+            <a:r>
+              <a:rPr lang="en-US" b="1" dirty="0">
+                <a:solidFill>
+                  <a:srgbClr val="D99694"/>
+                </a:solidFill>
+                <a:latin typeface="Lucida Console"/>
+                <a:cs typeface="Lucida Console"/>
+              </a:rPr>
+              <a:t>a</a:t>
+            </a:r>
+            <a:r>
+              <a:rPr lang="en-US" b="1" dirty="0" smtClean="0">
+                <a:solidFill>
+                  <a:srgbClr val="D99694"/>
+                </a:solidFill>
+                <a:latin typeface="Lucida Console"/>
+                <a:cs typeface="Lucida Console"/>
+              </a:rPr>
+              <a:t> </a:t>
+            </a:r>
+            <a:r>
+              <a:rPr lang="en-US" b="1" dirty="0">
+                <a:latin typeface="Lucida Console"/>
+                <a:cs typeface="Lucida Console"/>
+              </a:rPr>
+              <a:t>= </a:t>
+            </a:r>
+            <a:r>
+              <a:rPr lang="en-US" b="1" dirty="0" smtClean="0">
                 <a:solidFill>
                   <a:schemeClr val="tx2">
                     <a:lumMod val="60000"/>
@@ -3168,7 +3390,141 @@
                 <a:latin typeface="Lucida Console"/>
                 <a:cs typeface="Lucida Console"/>
               </a:rPr>
-              <a:t>esc</a:t>
+              <a:t>()</a:t>
+            </a:r>
+            <a:endParaRPr lang="en-US" b="1" dirty="0">
+              <a:latin typeface="Lucida Console"/>
+              <a:cs typeface="Lucida Console"/>
+            </a:endParaRPr>
+          </a:p>
+          <a:p>
+            <a:r>
+              <a:rPr lang="en-US" b="1" dirty="0" err="1">
+                <a:solidFill>
+                  <a:schemeClr val="accent2"/>
+                </a:solidFill>
+                <a:latin typeface="Lucida Console"/>
+                <a:cs typeface="Lucida Console"/>
+              </a:rPr>
+              <a:t>SynthesisePar</a:t>
+            </a:r>
+            <a:r>
+              <a:rPr lang="en-US" b="1" dirty="0">
+                <a:solidFill>
+                  <a:schemeClr val="accent2"/>
+                </a:solidFill>
+                <a:latin typeface="Lucida Console"/>
+                <a:cs typeface="Lucida Console"/>
+              </a:rPr>
+              <a:t> </a:t>
+            </a:r>
+            <a:r>
+              <a:rPr lang="en-US" b="1" dirty="0" smtClean="0">
+                <a:latin typeface="Lucida Console"/>
+                <a:cs typeface="Lucida Console"/>
+              </a:rPr>
+              <a:t>(</a:t>
+            </a:r>
+            <a:r>
+              <a:rPr lang="en-US" b="1" dirty="0">
+                <a:solidFill>
+                  <a:srgbClr val="9BBB59"/>
+                </a:solidFill>
+                <a:latin typeface="Lucida Console"/>
+                <a:cs typeface="Lucida Console"/>
+              </a:rPr>
+              <a:t>Rec</a:t>
+            </a:r>
+            <a:r>
+              <a:rPr lang="en-US" b="1" dirty="0">
+                <a:latin typeface="Lucida Console"/>
+                <a:cs typeface="Lucida Console"/>
+              </a:rPr>
+              <a:t> </a:t>
+            </a:r>
+            <a:r>
+              <a:rPr lang="en-US" b="1" dirty="0" smtClean="0">
+                <a:solidFill>
+                  <a:srgbClr val="D99694"/>
+                </a:solidFill>
+                <a:latin typeface="Lucida Console"/>
+                <a:cs typeface="Lucida Console"/>
+              </a:rPr>
+              <a:t>d</a:t>
+            </a:r>
+            <a:r>
+              <a:rPr lang="en-US" b="1" dirty="0">
+                <a:latin typeface="Lucida Console"/>
+                <a:cs typeface="Lucida Console"/>
+              </a:rPr>
+              <a:t>) </a:t>
+            </a:r>
+            <a:r>
+              <a:rPr lang="en-US" b="1" dirty="0" smtClean="0">
+                <a:latin typeface="Lucida Console"/>
+                <a:cs typeface="Lucida Console"/>
+              </a:rPr>
+              <a:t>  </a:t>
+            </a:r>
+            <a:r>
+              <a:rPr lang="en-US" b="1" dirty="0" smtClean="0">
+                <a:solidFill>
+                  <a:srgbClr val="D99694"/>
+                </a:solidFill>
+                <a:latin typeface="Lucida Console"/>
+                <a:cs typeface="Lucida Console"/>
+              </a:rPr>
+              <a:t>x </a:t>
+            </a:r>
+            <a:r>
+              <a:rPr lang="en-US" b="1" dirty="0">
+                <a:solidFill>
+                  <a:srgbClr val="D99694"/>
+                </a:solidFill>
+                <a:latin typeface="Lucida Console"/>
+                <a:cs typeface="Lucida Console"/>
+              </a:rPr>
+              <a:t>a</a:t>
+            </a:r>
+            <a:r>
+              <a:rPr lang="en-US" b="1" dirty="0" smtClean="0">
+                <a:solidFill>
+                  <a:srgbClr val="D99694"/>
+                </a:solidFill>
+                <a:latin typeface="Lucida Console"/>
+                <a:cs typeface="Lucida Console"/>
+              </a:rPr>
+              <a:t> </a:t>
+            </a:r>
+            <a:r>
+              <a:rPr lang="en-US" b="1" dirty="0">
+                <a:latin typeface="Lucida Console"/>
+                <a:cs typeface="Lucida Console"/>
+              </a:rPr>
+              <a:t>= </a:t>
+            </a:r>
+            <a:endParaRPr lang="en-US" b="1" dirty="0" smtClean="0">
+              <a:latin typeface="Lucida Console"/>
+              <a:cs typeface="Lucida Console"/>
+            </a:endParaRPr>
+          </a:p>
+          <a:p>
+            <a:r>
+              <a:rPr lang="en-US" b="1" dirty="0" smtClean="0">
+                <a:latin typeface="Lucida Console"/>
+                <a:cs typeface="Lucida Console"/>
+              </a:rPr>
+              <a:t>	</a:t>
+            </a:r>
+            <a:r>
+              <a:rPr lang="en-US" b="1" dirty="0" smtClean="0">
+                <a:solidFill>
+                  <a:srgbClr val="558ED5"/>
+                </a:solidFill>
+                <a:latin typeface="Lucida Console"/>
+                <a:cs typeface="Lucida Console"/>
+              </a:rPr>
+              <a:t>(</a:t>
             </a:r>
             <a:r>
               <a:rPr lang="en-US" b="1" dirty="0" smtClean="0">
@@ -3181,21 +3537,123 @@
                 <a:latin typeface="Lucida Console"/>
                 <a:cs typeface="Lucida Console"/>
               </a:rPr>
+              <a:t>rec</a:t>
+            </a:r>
+            <a:r>
+              <a:rPr lang="en-US" b="1" dirty="0" smtClean="0">
+                <a:latin typeface="Lucida Console"/>
+                <a:cs typeface="Lucida Console"/>
+              </a:rPr>
+              <a:t> : </a:t>
+            </a:r>
+            <a:r>
+              <a:rPr lang="en-US" b="1" dirty="0" smtClean="0">
+                <a:solidFill>
+                  <a:srgbClr val="D99694"/>
+                </a:solidFill>
+                <a:latin typeface="Lucida Console"/>
+                <a:cs typeface="Lucida Console"/>
+              </a:rPr>
+              <a:t>x a </a:t>
+            </a:r>
+            <a:r>
+              <a:rPr lang="en-US" b="1" dirty="0" smtClean="0">
+                <a:solidFill>
+                  <a:srgbClr val="558ED5"/>
+                </a:solidFill>
+                <a:latin typeface="Lucida Console"/>
+                <a:cs typeface="Lucida Console"/>
+              </a:rPr>
+              <a:t>**</a:t>
+            </a:r>
+            <a:r>
+              <a:rPr lang="en-US" b="1" dirty="0" smtClean="0">
+                <a:latin typeface="Lucida Console"/>
+                <a:cs typeface="Lucida Console"/>
+              </a:rPr>
               <a:t> </a:t>
             </a:r>
             <a:r>
-              <a:rPr lang="en-US" b="1" dirty="0" smtClean="0">
-                <a:latin typeface="Lucida Console"/>
-                <a:cs typeface="Lucida Console"/>
-              </a:rPr>
-              <a:t>-</a:t>
+              <a:rPr lang="en-US" b="1" dirty="0" err="1">
+                <a:solidFill>
+                  <a:schemeClr val="accent2"/>
+                </a:solidFill>
+                <a:latin typeface="Lucida Console"/>
+                <a:cs typeface="Lucida Console"/>
+              </a:rPr>
+              <a:t>SynthesisePar</a:t>
             </a:r>
             <a:r>
               <a:rPr lang="en-US" b="1" dirty="0">
-                <a:latin typeface="Lucida Console"/>
-                <a:cs typeface="Lucida Console"/>
-              </a:rPr>
-              <a:t>&gt; </a:t>
+                <a:solidFill>
+                  <a:schemeClr val="accent2"/>
+                </a:solidFill>
+                <a:latin typeface="Lucida Console"/>
+                <a:cs typeface="Lucida Console"/>
+              </a:rPr>
+              <a:t> </a:t>
+            </a:r>
+            <a:r>
+              <a:rPr lang="en-US" b="1" dirty="0" smtClean="0">
+                <a:solidFill>
+                  <a:srgbClr val="D99694"/>
+                </a:solidFill>
+                <a:latin typeface="Lucida Console"/>
+                <a:cs typeface="Lucida Console"/>
+              </a:rPr>
+              <a:t>d </a:t>
+            </a:r>
+            <a:r>
+              <a:rPr lang="en-US" b="1" dirty="0" smtClean="0">
+                <a:solidFill>
+                  <a:srgbClr val="D99694"/>
+                </a:solidFill>
+                <a:latin typeface="Lucida Console"/>
+                <a:cs typeface="Lucida Console"/>
+              </a:rPr>
+              <a:t>x </a:t>
+            </a:r>
+            <a:r>
+              <a:rPr lang="en-US" b="1" dirty="0">
+                <a:solidFill>
+                  <a:srgbClr val="D99694"/>
+                </a:solidFill>
+                <a:latin typeface="Lucida Console"/>
+                <a:cs typeface="Lucida Console"/>
+              </a:rPr>
+              <a:t>a</a:t>
+            </a:r>
+            <a:r>
+              <a:rPr lang="en-US" b="1" dirty="0" smtClean="0">
+                <a:solidFill>
+                  <a:srgbClr val="558ED5"/>
+                </a:solidFill>
+                <a:latin typeface="Lucida Console"/>
+                <a:cs typeface="Lucida Console"/>
+              </a:rPr>
+              <a:t>)</a:t>
+            </a:r>
+          </a:p>
+          <a:p>
+            <a:r>
+              <a:rPr lang="en-US" b="1" dirty="0" err="1">
+                <a:solidFill>
+                  <a:schemeClr val="accent2"/>
+                </a:solidFill>
+                <a:latin typeface="Lucida Console"/>
+                <a:cs typeface="Lucida Console"/>
+              </a:rPr>
+              <a:t>SynthesisePar</a:t>
+            </a:r>
+            <a:r>
+              <a:rPr lang="en-US" b="1" dirty="0">
+                <a:solidFill>
+                  <a:schemeClr val="accent2"/>
+                </a:solidFill>
+                <a:latin typeface="Lucida Console"/>
+                <a:cs typeface="Lucida Console"/>
+              </a:rPr>
+              <a:t> </a:t>
             </a:r>
             <a:r>
               <a:rPr lang="en-US" b="1" dirty="0" smtClean="0">
@@ -3205,22 +3663,19 @@
               <a:t>(</a:t>
             </a:r>
             <a:r>
+              <a:rPr lang="en-US" b="1" dirty="0" err="1">
+                <a:solidFill>
+                  <a:srgbClr val="9BBB59"/>
+                </a:solidFill>
+                <a:latin typeface="Lucida Console"/>
+                <a:cs typeface="Lucida Console"/>
+              </a:rPr>
+              <a:t>Arg</a:t>
+            </a:r>
+            <a:r>
               <a:rPr lang="en-US" b="1" dirty="0">
                 <a:solidFill>
-                  <a:srgbClr val="558ED5"/>
-                </a:solidFill>
-                <a:latin typeface="Lucida Console"/>
-                <a:cs typeface="Lucida Console"/>
-              </a:rPr>
-              <a:t>Type</a:t>
-            </a:r>
-            <a:r>
-              <a:rPr lang="en-US" b="1" dirty="0" smtClean="0">
-                <a:solidFill>
-                  <a:schemeClr val="accent2">
-                    <a:lumMod val="60000"/>
-                    <a:lumOff val="40000"/>
-                  </a:schemeClr>
+                  <a:srgbClr val="9BBB59"/>
                 </a:solidFill>
                 <a:latin typeface="Lucida Console"/>
                 <a:cs typeface="Lucida Console"/>
@@ -3228,256 +3683,41 @@
               <a:t> </a:t>
             </a:r>
             <a:r>
-              <a:rPr lang="en-US" b="1" dirty="0" smtClean="0">
-                <a:latin typeface="Lucida Console"/>
-                <a:cs typeface="Lucida Console"/>
-              </a:rPr>
-              <a:t>-</a:t>
-            </a:r>
-            <a:r>
               <a:rPr lang="en-US" b="1" dirty="0">
-                <a:latin typeface="Lucida Console"/>
-                <a:cs typeface="Lucida Console"/>
-              </a:rPr>
-              <a:t>&gt; </a:t>
+                <a:solidFill>
+                  <a:srgbClr val="D99694"/>
+                </a:solidFill>
+                <a:latin typeface="Lucida Console"/>
+                <a:cs typeface="Lucida Console"/>
+              </a:rPr>
+              <a:t>b</a:t>
+            </a:r>
+            <a:r>
+              <a:rPr lang="en-US" b="1" dirty="0" smtClean="0">
+                <a:solidFill>
+                  <a:srgbClr val="D99694"/>
+                </a:solidFill>
+                <a:latin typeface="Lucida Console"/>
+                <a:cs typeface="Lucida Console"/>
+              </a:rPr>
+              <a:t> </a:t>
             </a:r>
             <a:r>
               <a:rPr lang="en-US" b="1" dirty="0">
                 <a:solidFill>
-                  <a:srgbClr val="558ED5"/>
-                </a:solidFill>
-                <a:latin typeface="Lucida Console"/>
-                <a:cs typeface="Lucida Console"/>
-              </a:rPr>
-              <a:t>Type</a:t>
-            </a:r>
-            <a:r>
-              <a:rPr lang="en-US" b="1" dirty="0">
-                <a:latin typeface="Lucida Console"/>
-                <a:cs typeface="Lucida Console"/>
-              </a:rPr>
-              <a:t>) -&gt; </a:t>
-            </a:r>
-            <a:r>
-              <a:rPr lang="en-US" b="1" dirty="0" smtClean="0">
-                <a:latin typeface="Lucida Console"/>
-                <a:cs typeface="Lucida Console"/>
-              </a:rPr>
-              <a:t>(</a:t>
-            </a:r>
-            <a:r>
-              <a:rPr lang="en-US" b="1" dirty="0">
-                <a:solidFill>
-                  <a:srgbClr val="558ED5"/>
-                </a:solidFill>
-                <a:latin typeface="Lucida Console"/>
-                <a:cs typeface="Lucida Console"/>
-              </a:rPr>
-              <a:t>Type</a:t>
-            </a:r>
-            <a:r>
-              <a:rPr lang="en-US" b="1" dirty="0" smtClean="0">
-                <a:solidFill>
                   <a:srgbClr val="D99694"/>
                 </a:solidFill>
                 <a:latin typeface="Lucida Console"/>
                 <a:cs typeface="Lucida Console"/>
               </a:rPr>
-              <a:t> </a:t>
-            </a:r>
-            <a:r>
-              <a:rPr lang="en-US" b="1" dirty="0" smtClean="0">
-                <a:latin typeface="Lucida Console"/>
-                <a:cs typeface="Lucida Console"/>
-              </a:rPr>
-              <a:t>-</a:t>
-            </a:r>
-            <a:r>
-              <a:rPr lang="en-US" b="1" dirty="0">
-                <a:latin typeface="Lucida Console"/>
-                <a:cs typeface="Lucida Console"/>
-              </a:rPr>
-              <a:t>&gt; </a:t>
-            </a:r>
-            <a:r>
-              <a:rPr lang="en-US" b="1" dirty="0">
-                <a:solidFill>
-                  <a:srgbClr val="558ED5"/>
-                </a:solidFill>
-                <a:latin typeface="Lucida Console"/>
-                <a:cs typeface="Lucida Console"/>
-              </a:rPr>
-              <a:t>Type</a:t>
-            </a:r>
-            <a:r>
-              <a:rPr lang="en-US" b="1" dirty="0">
-                <a:latin typeface="Lucida Console"/>
-                <a:cs typeface="Lucida Console"/>
-              </a:rPr>
-              <a:t>)</a:t>
-            </a:r>
-          </a:p>
-          <a:p>
-            <a:r>
-              <a:rPr lang="en-US" b="1" dirty="0" err="1">
-                <a:solidFill>
-                  <a:srgbClr val="C0504D"/>
-                </a:solidFill>
-                <a:latin typeface="Lucida Console"/>
-                <a:cs typeface="Lucida Console"/>
-              </a:rPr>
-              <a:t>Synthesise</a:t>
-            </a:r>
-            <a:r>
-              <a:rPr lang="en-US" b="1" dirty="0">
-                <a:solidFill>
-                  <a:srgbClr val="C0504D"/>
-                </a:solidFill>
-                <a:latin typeface="Lucida Console"/>
-                <a:cs typeface="Lucida Console"/>
-              </a:rPr>
-              <a:t> </a:t>
-            </a:r>
-            <a:r>
-              <a:rPr lang="en-US" b="1" dirty="0" smtClean="0">
-                <a:solidFill>
-                  <a:schemeClr val="accent3"/>
-                </a:solidFill>
-                <a:latin typeface="Lucida Console"/>
-                <a:cs typeface="Lucida Console"/>
-              </a:rPr>
-              <a:t>Ret</a:t>
-            </a:r>
-            <a:r>
-              <a:rPr lang="en-US" b="1" dirty="0" smtClean="0">
-                <a:latin typeface="Lucida Console"/>
-                <a:cs typeface="Lucida Console"/>
-              </a:rPr>
-              <a:t>       </a:t>
-            </a:r>
-            <a:r>
-              <a:rPr lang="en-US" b="1" dirty="0" smtClean="0">
-                <a:solidFill>
-                  <a:srgbClr val="D99694"/>
-                </a:solidFill>
-                <a:latin typeface="Lucida Console"/>
-                <a:cs typeface="Lucida Console"/>
-              </a:rPr>
-              <a:t>x </a:t>
-            </a:r>
-            <a:r>
-              <a:rPr lang="en-US" b="1" dirty="0">
-                <a:solidFill>
-                  <a:srgbClr val="D99694"/>
-                </a:solidFill>
-                <a:latin typeface="Lucida Console"/>
-                <a:cs typeface="Lucida Console"/>
-              </a:rPr>
-              <a:t>a</a:t>
-            </a:r>
-            <a:r>
-              <a:rPr lang="en-US" b="1" dirty="0" smtClean="0">
-                <a:solidFill>
-                  <a:srgbClr val="D99694"/>
-                </a:solidFill>
-                <a:latin typeface="Lucida Console"/>
-                <a:cs typeface="Lucida Console"/>
-              </a:rPr>
-              <a:t> </a:t>
-            </a:r>
-            <a:r>
-              <a:rPr lang="en-US" b="1" dirty="0">
-                <a:latin typeface="Lucida Console"/>
-                <a:cs typeface="Lucida Console"/>
-              </a:rPr>
-              <a:t>= </a:t>
-            </a:r>
-            <a:r>
-              <a:rPr lang="en-US" b="1" dirty="0" smtClean="0">
-                <a:solidFill>
-                  <a:schemeClr val="tx2">
-                    <a:lumMod val="60000"/>
-                    <a:lumOff val="40000"/>
-                  </a:schemeClr>
-                </a:solidFill>
-                <a:latin typeface="Lucida Console"/>
-                <a:cs typeface="Lucida Console"/>
-              </a:rPr>
-              <a:t>()</a:t>
-            </a:r>
-            <a:endParaRPr lang="en-US" b="1" dirty="0">
-              <a:latin typeface="Lucida Console"/>
-              <a:cs typeface="Lucida Console"/>
-            </a:endParaRPr>
-          </a:p>
-          <a:p>
-            <a:r>
-              <a:rPr lang="en-US" b="1" dirty="0" err="1">
-                <a:solidFill>
-                  <a:srgbClr val="C0504D"/>
-                </a:solidFill>
-                <a:latin typeface="Lucida Console"/>
-                <a:cs typeface="Lucida Console"/>
-              </a:rPr>
-              <a:t>Synthesise</a:t>
-            </a:r>
-            <a:r>
-              <a:rPr lang="en-US" b="1" dirty="0">
-                <a:solidFill>
-                  <a:srgbClr val="C0504D"/>
-                </a:solidFill>
-                <a:latin typeface="Lucida Console"/>
-                <a:cs typeface="Lucida Console"/>
-              </a:rPr>
-              <a:t> </a:t>
-            </a:r>
-            <a:r>
-              <a:rPr lang="en-US" b="1" dirty="0">
-                <a:latin typeface="Lucida Console"/>
-                <a:cs typeface="Lucida Console"/>
-              </a:rPr>
-              <a:t>(</a:t>
-            </a:r>
-            <a:r>
-              <a:rPr lang="en-US" b="1" dirty="0">
-                <a:solidFill>
-                  <a:srgbClr val="9BBB59"/>
-                </a:solidFill>
-                <a:latin typeface="Lucida Console"/>
-                <a:cs typeface="Lucida Console"/>
-              </a:rPr>
-              <a:t>Rec</a:t>
-            </a:r>
-            <a:r>
-              <a:rPr lang="en-US" b="1" dirty="0">
-                <a:latin typeface="Lucida Console"/>
-                <a:cs typeface="Lucida Console"/>
-              </a:rPr>
-              <a:t> </a:t>
-            </a:r>
-            <a:r>
-              <a:rPr lang="en-US" b="1" dirty="0" smtClean="0">
-                <a:solidFill>
-                  <a:srgbClr val="D99694"/>
-                </a:solidFill>
-                <a:latin typeface="Lucida Console"/>
-                <a:cs typeface="Lucida Console"/>
-              </a:rPr>
               <a:t>d</a:t>
             </a:r>
             <a:r>
-              <a:rPr lang="en-US" b="1" dirty="0">
+              <a:rPr lang="en-US" b="1" dirty="0" smtClean="0">
                 <a:latin typeface="Lucida Console"/>
                 <a:cs typeface="Lucida Console"/>
               </a:rPr>
               <a:t>) </a:t>
-            </a:r>
-            <a:r>
-              <a:rPr lang="en-US" b="1" dirty="0" smtClean="0">
-                <a:latin typeface="Lucida Console"/>
-                <a:cs typeface="Lucida Console"/>
-              </a:rPr>
-              <a:t>  </a:t>
             </a:r>
             <a:r>
               <a:rPr lang="en-US" b="1" dirty="0" smtClean="0">
@@ -3540,34 +3780,14 @@
               <a:t>(</a:t>
             </a:r>
             <a:r>
-              <a:rPr lang="en-US" b="1" dirty="0" smtClean="0">
-                <a:solidFill>
-                  <a:schemeClr val="accent2">
-                    <a:lumMod val="60000"/>
-                    <a:lumOff val="40000"/>
-                  </a:schemeClr>
-                </a:solidFill>
-                <a:latin typeface="Lucida Console"/>
-                <a:cs typeface="Lucida Console"/>
-              </a:rPr>
-              <a:t>rec</a:t>
-            </a:r>
-            <a:r>
-              <a:rPr lang="en-US" b="1" dirty="0" smtClean="0">
-                <a:latin typeface="Lucida Console"/>
-                <a:cs typeface="Lucida Console"/>
-              </a:rPr>
-              <a:t> : </a:t>
-            </a:r>
-            <a:r>
-              <a:rPr lang="en-US" b="1" dirty="0" smtClean="0">
+              <a:rPr lang="en-US" b="1" dirty="0" err="1" smtClean="0">
                 <a:solidFill>
                   <a:srgbClr val="D99694"/>
                 </a:solidFill>
                 <a:latin typeface="Lucida Console"/>
                 <a:cs typeface="Lucida Console"/>
               </a:rPr>
-              <a:t>x </a:t>
+              <a:t>arg</a:t>
             </a:r>
             <a:r>
               <a:rPr lang="en-US" b="1" dirty="0" smtClean="0">
@@ -3577,7 +3797,31 @@
                 <a:latin typeface="Lucida Console"/>
                 <a:cs typeface="Lucida Console"/>
               </a:rPr>
-              <a:t>a </a:t>
+              <a:t> </a:t>
+            </a:r>
+            <a:r>
+              <a:rPr lang="en-US" b="1" dirty="0" smtClean="0">
+                <a:latin typeface="Lucida Console"/>
+                <a:cs typeface="Lucida Console"/>
+              </a:rPr>
+              <a:t>: </a:t>
+            </a:r>
+            <a:r>
+              <a:rPr lang="en-US" b="1" dirty="0">
+                <a:solidFill>
+                  <a:srgbClr val="D99694"/>
+                </a:solidFill>
+                <a:latin typeface="Lucida Console"/>
+                <a:cs typeface="Lucida Console"/>
+              </a:rPr>
+              <a:t>b</a:t>
+            </a:r>
+            <a:r>
+              <a:rPr lang="en-US" b="1" dirty="0" smtClean="0">
+                <a:latin typeface="Lucida Console"/>
+                <a:cs typeface="Lucida Console"/>
+              </a:rPr>
+              <a:t> </a:t>
             </a:r>
             <a:r>
               <a:rPr lang="en-US" b="1" dirty="0" smtClean="0">
@@ -3597,281 +3841,17 @@
               <a:t> </a:t>
             </a:r>
             <a:r>
-              <a:rPr lang="en-US" b="1" dirty="0" err="1" smtClean="0">
-                <a:solidFill>
-                  <a:srgbClr val="C0504D"/>
-                </a:solidFill>
-                <a:latin typeface="Lucida Console"/>
-                <a:cs typeface="Lucida Console"/>
-              </a:rPr>
-              <a:t>Synthesise</a:t>
-            </a:r>
-            <a:r>
-              <a:rPr lang="en-US" b="1" dirty="0" smtClean="0">
-                <a:solidFill>
-                  <a:srgbClr val="C0504D"/>
-                </a:solidFill>
-                <a:latin typeface="Lucida Console"/>
-                <a:cs typeface="Lucida Console"/>
-              </a:rPr>
-              <a:t> </a:t>
-            </a:r>
-            <a:r>
-              <a:rPr lang="en-US" b="1" dirty="0" smtClean="0">
-                <a:solidFill>
-                  <a:srgbClr val="D99694"/>
-                </a:solidFill>
-                <a:latin typeface="Lucida Console"/>
-                <a:cs typeface="Lucida Console"/>
-              </a:rPr>
-              <a:t>d x </a:t>
+              <a:rPr lang="en-US" b="1" dirty="0" err="1">
+                <a:solidFill>
+                  <a:schemeClr val="accent2"/>
+                </a:solidFill>
+                <a:latin typeface="Lucida Console"/>
+                <a:cs typeface="Lucida Console"/>
+              </a:rPr>
+              <a:t>SynthesisePar</a:t>
             </a:r>
             <a:r>
               <a:rPr lang="en-US" b="1" dirty="0">
-                <a:solidFill>
-                  <a:srgbClr val="D99694"/>
-                </a:solidFill>
-                <a:latin typeface="Lucida Console"/>
-                <a:cs typeface="Lucida Console"/>
-              </a:rPr>
-              <a:t>a</a:t>
-            </a:r>
-            <a:r>
-              <a:rPr lang="en-US" b="1" dirty="0" smtClean="0">
-                <a:solidFill>
-                  <a:srgbClr val="558ED5"/>
-                </a:solidFill>
-                <a:latin typeface="Lucida Console"/>
-                <a:cs typeface="Lucida Console"/>
-              </a:rPr>
-              <a:t>)</a:t>
-            </a:r>
-            <a:endParaRPr lang="en-US" b="1" dirty="0" smtClean="0">
-              <a:solidFill>
-                <a:srgbClr val="558ED5"/>
-              </a:solidFill>
-              <a:latin typeface="Lucida Console"/>
-              <a:cs typeface="Lucida Console"/>
-            </a:endParaRPr>
-          </a:p>
-          <a:p>
-            <a:r>
-              <a:rPr lang="en-US" b="1" dirty="0" err="1" smtClean="0">
-                <a:solidFill>
-                  <a:srgbClr val="C0504D"/>
-                </a:solidFill>
-                <a:latin typeface="Lucida Console"/>
-                <a:cs typeface="Lucida Console"/>
-              </a:rPr>
-              <a:t>Synthesise</a:t>
-            </a:r>
-            <a:r>
-              <a:rPr lang="en-US" b="1" dirty="0" smtClean="0">
-                <a:solidFill>
-                  <a:srgbClr val="C0504D"/>
-                </a:solidFill>
-                <a:latin typeface="Lucida Console"/>
-                <a:cs typeface="Lucida Console"/>
-              </a:rPr>
-              <a:t> </a:t>
-            </a:r>
-            <a:r>
-              <a:rPr lang="en-US" b="1" dirty="0">
-                <a:latin typeface="Lucida Console"/>
-                <a:cs typeface="Lucida Console"/>
-              </a:rPr>
-              <a:t>(</a:t>
-            </a:r>
-            <a:r>
-              <a:rPr lang="en-US" b="1" dirty="0" err="1">
-                <a:solidFill>
-                  <a:srgbClr val="9BBB59"/>
-                </a:solidFill>
-                <a:latin typeface="Lucida Console"/>
-                <a:cs typeface="Lucida Console"/>
-              </a:rPr>
-              <a:t>Arg</a:t>
-            </a:r>
-            <a:r>
-              <a:rPr lang="en-US" b="1" dirty="0">
-                <a:solidFill>
-                  <a:srgbClr val="9BBB59"/>
-                </a:solidFill>
-                <a:latin typeface="Lucida Console"/>
-                <a:cs typeface="Lucida Console"/>
-              </a:rPr>
-              <a:t> </a:t>
-            </a:r>
-            <a:r>
-              <a:rPr lang="en-US" b="1" dirty="0">
-                <a:solidFill>
-                  <a:srgbClr val="D99694"/>
-                </a:solidFill>
-                <a:latin typeface="Lucida Console"/>
-                <a:cs typeface="Lucida Console"/>
-              </a:rPr>
-              <a:t>b</a:t>
-            </a:r>
-            <a:r>
-              <a:rPr lang="en-US" b="1" dirty="0" smtClean="0">
-                <a:solidFill>
-                  <a:srgbClr val="D99694"/>
-                </a:solidFill>
-                <a:latin typeface="Lucida Console"/>
-                <a:cs typeface="Lucida Console"/>
-              </a:rPr>
-              <a:t> </a:t>
-            </a:r>
-            <a:r>
-              <a:rPr lang="en-US" b="1" dirty="0">
-                <a:solidFill>
-                  <a:srgbClr val="D99694"/>
-                </a:solidFill>
-                <a:latin typeface="Lucida Console"/>
-                <a:cs typeface="Lucida Console"/>
-              </a:rPr>
-              <a:t>d</a:t>
-            </a:r>
-            <a:r>
-              <a:rPr lang="en-US" b="1" dirty="0" smtClean="0">
-                <a:latin typeface="Lucida Console"/>
-                <a:cs typeface="Lucida Console"/>
-              </a:rPr>
-              <a:t>) </a:t>
-            </a:r>
-            <a:r>
-              <a:rPr lang="en-US" b="1" dirty="0" smtClean="0">
-                <a:solidFill>
-                  <a:srgbClr val="D99694"/>
-                </a:solidFill>
-                <a:latin typeface="Lucida Console"/>
-                <a:cs typeface="Lucida Console"/>
-              </a:rPr>
-              <a:t>x </a:t>
-            </a:r>
-            <a:r>
-              <a:rPr lang="en-US" b="1" dirty="0">
-                <a:solidFill>
-                  <a:srgbClr val="D99694"/>
-                </a:solidFill>
-                <a:latin typeface="Lucida Console"/>
-                <a:cs typeface="Lucida Console"/>
-              </a:rPr>
-              <a:t>a</a:t>
-            </a:r>
-            <a:r>
-              <a:rPr lang="en-US" b="1" dirty="0" smtClean="0">
-                <a:solidFill>
-                  <a:srgbClr val="D99694"/>
-                </a:solidFill>
-                <a:latin typeface="Lucida Console"/>
-                <a:cs typeface="Lucida Console"/>
-              </a:rPr>
-              <a:t> </a:t>
-            </a:r>
-            <a:r>
-              <a:rPr lang="en-US" b="1" dirty="0">
-                <a:latin typeface="Lucida Console"/>
-                <a:cs typeface="Lucida Console"/>
-              </a:rPr>
-              <a:t>= </a:t>
-            </a:r>
-            <a:endParaRPr lang="en-US" b="1" dirty="0" smtClean="0">
-              <a:latin typeface="Lucida Console"/>
-              <a:cs typeface="Lucida Console"/>
-            </a:endParaRPr>
-          </a:p>
-          <a:p>
-            <a:r>
-              <a:rPr lang="en-US" b="1" dirty="0" smtClean="0">
-                <a:latin typeface="Lucida Console"/>
-                <a:cs typeface="Lucida Console"/>
-              </a:rPr>
-              <a:t>	</a:t>
-            </a:r>
-            <a:r>
-              <a:rPr lang="en-US" b="1" dirty="0" smtClean="0">
-                <a:solidFill>
-                  <a:srgbClr val="558ED5"/>
-                </a:solidFill>
-                <a:latin typeface="Lucida Console"/>
-                <a:cs typeface="Lucida Console"/>
-              </a:rPr>
-              <a:t>(</a:t>
-            </a:r>
-            <a:r>
-              <a:rPr lang="en-US" b="1" dirty="0" err="1" smtClean="0">
-                <a:solidFill>
-                  <a:srgbClr val="D99694"/>
-                </a:solidFill>
-                <a:latin typeface="Lucida Console"/>
-                <a:cs typeface="Lucida Console"/>
-              </a:rPr>
-              <a:t>arg</a:t>
-            </a:r>
-            <a:r>
-              <a:rPr lang="en-US" b="1" dirty="0" smtClean="0">
-                <a:solidFill>
-                  <a:srgbClr val="D99694"/>
-                </a:solidFill>
-                <a:latin typeface="Lucida Console"/>
-                <a:cs typeface="Lucida Console"/>
-              </a:rPr>
-              <a:t> </a:t>
-            </a:r>
-            <a:r>
-              <a:rPr lang="en-US" b="1" dirty="0" smtClean="0">
-                <a:latin typeface="Lucida Console"/>
-                <a:cs typeface="Lucida Console"/>
-              </a:rPr>
-              <a:t>: </a:t>
-            </a:r>
-            <a:r>
-              <a:rPr lang="en-US" b="1" dirty="0">
-                <a:solidFill>
-                  <a:srgbClr val="D99694"/>
-                </a:solidFill>
-                <a:latin typeface="Lucida Console"/>
-                <a:cs typeface="Lucida Console"/>
-              </a:rPr>
-              <a:t>b</a:t>
-            </a:r>
-            <a:r>
-              <a:rPr lang="en-US" b="1" dirty="0" smtClean="0">
-                <a:latin typeface="Lucida Console"/>
-                <a:cs typeface="Lucida Console"/>
-              </a:rPr>
-              <a:t> </a:t>
-            </a:r>
-            <a:r>
-              <a:rPr lang="en-US" b="1" dirty="0" smtClean="0">
-                <a:solidFill>
-                  <a:srgbClr val="558ED5"/>
-                </a:solidFill>
-                <a:latin typeface="Lucida Console"/>
-                <a:cs typeface="Lucida Console"/>
-              </a:rPr>
-              <a:t>**</a:t>
-            </a:r>
-            <a:r>
-              <a:rPr lang="en-US" b="1" dirty="0" smtClean="0">
-                <a:latin typeface="Lucida Console"/>
-                <a:cs typeface="Lucida Console"/>
-              </a:rPr>
-              <a:t> </a:t>
-            </a:r>
-            <a:r>
-              <a:rPr lang="en-US" b="1" dirty="0" err="1" smtClean="0">
-                <a:solidFill>
-                  <a:schemeClr val="accent2"/>
-                </a:solidFill>
-                <a:latin typeface="Lucida Console"/>
-                <a:cs typeface="Lucida Console"/>
-              </a:rPr>
-              <a:t>Synthesise</a:t>
-            </a:r>
-            <a:r>
-              <a:rPr lang="en-US" b="1" dirty="0" smtClean="0">
                 <a:solidFill>
                   <a:schemeClr val="accent2"/>
                 </a:solidFill>
@@ -3963,17 +3943,17 @@
             <a:r>
               <a:rPr lang="en-US" b="1" dirty="0" err="1">
                 <a:solidFill>
-                  <a:srgbClr val="C0504D"/>
-                </a:solidFill>
-                <a:latin typeface="Lucida Console"/>
-                <a:cs typeface="Lucida Console"/>
-              </a:rPr>
-              <a:t>Synthesise</a:t>
+                  <a:schemeClr val="accent2"/>
+                </a:solidFill>
+                <a:latin typeface="Lucida Console"/>
+                <a:cs typeface="Lucida Console"/>
+              </a:rPr>
+              <a:t>SynthesisePar</a:t>
             </a:r>
             <a:r>
               <a:rPr lang="en-US" b="1" dirty="0">
                 <a:solidFill>
-                  <a:srgbClr val="C0504D"/>
+                  <a:schemeClr val="accent2"/>
                 </a:solidFill>
                 <a:latin typeface="Lucida Console"/>
                 <a:cs typeface="Lucida Console"/>
@@ -4119,7 +4099,7 @@
                 <a:latin typeface="Lucida Console"/>
                 <a:cs typeface="Lucida Console"/>
               </a:rPr>
-              <a:t>Synthesise</a:t>
+              <a:t>SynthesisePar</a:t>
             </a:r>
             <a:r>
               <a:rPr lang="en-US" b="1" dirty="0">

</xml_diff>